<commit_message>
test OC seasonal example with immunity
</commit_message>
<xml_diff>
--- a/presentations/seasonalbirths.pptx
+++ b/presentations/seasonalbirths.pptx
@@ -7,6 +7,8 @@
   <p:sldIdLst>
     <p:sldId id="256" r:id="rId2"/>
     <p:sldId id="257" r:id="rId3"/>
+    <p:sldId id="258" r:id="rId4"/>
+    <p:sldId id="259" r:id="rId5"/>
   </p:sldIdLst>
   <p:sldSz cx="12192000" cy="6858000"/>
   <p:notesSz cx="6858000" cy="9144000"/>
@@ -3532,13 +3534,8 @@
             <a:pPr lvl="1"/>
             <a:r>
               <a:rPr lang="en-US" dirty="0"/>
-              <a:t>10 year </a:t>
-            </a:r>
-            <a:r>
-              <a:rPr lang="en-US"/>
-              <a:t>simulation period</a:t>
-            </a:r>
-            <a:endParaRPr lang="en-US" dirty="0"/>
+              <a:t>10 year simulation period</a:t>
+            </a:r>
           </a:p>
           <a:p>
             <a:endParaRPr lang="en-US" dirty="0"/>
@@ -3547,10 +3544,10 @@
       </p:sp>
       <p:pic>
         <p:nvPicPr>
-          <p:cNvPr id="4" name="Picture 3">
-            <a:extLst>
-              <a:ext uri="{FF2B5EF4-FFF2-40B4-BE49-F238E27FC236}">
-                <a16:creationId xmlns:a16="http://schemas.microsoft.com/office/drawing/2014/main" id="{0A06CF10-3AC9-7A0C-2E18-AB4F68E30337}"/>
+          <p:cNvPr id="6" name="Picture 5">
+            <a:extLst>
+              <a:ext uri="{FF2B5EF4-FFF2-40B4-BE49-F238E27FC236}">
+                <a16:creationId xmlns:a16="http://schemas.microsoft.com/office/drawing/2014/main" id="{6C2A7201-D949-2DB7-F6B1-FF0A6A4099F3}"/>
               </a:ext>
             </a:extLst>
           </p:cNvPr>
@@ -3567,8 +3564,8 @@
         </p:blipFill>
         <p:spPr>
           <a:xfrm>
-            <a:off x="6195289" y="1706389"/>
-            <a:ext cx="5734979" cy="4470574"/>
+            <a:off x="6096000" y="1960459"/>
+            <a:ext cx="5924483" cy="4081669"/>
           </a:xfrm>
           <a:prstGeom prst="rect">
             <a:avLst/>
@@ -3579,6 +3576,402 @@
     <p:extLst>
       <p:ext uri="{BB962C8B-B14F-4D97-AF65-F5344CB8AC3E}">
         <p14:creationId xmlns:p14="http://schemas.microsoft.com/office/powerpoint/2010/main" val="2228032084"/>
+      </p:ext>
+    </p:extLst>
+  </p:cSld>
+  <p:clrMapOvr>
+    <a:masterClrMapping/>
+  </p:clrMapOvr>
+</p:sld>
+</file>
+
+<file path=ppt/slides/slide3.xml><?xml version="1.0" encoding="utf-8"?>
+<p:sld xmlns:a="http://schemas.openxmlformats.org/drawingml/2006/main" xmlns:r="http://schemas.openxmlformats.org/officeDocument/2006/relationships" xmlns:p="http://schemas.openxmlformats.org/presentationml/2006/main">
+  <p:cSld>
+    <p:spTree>
+      <p:nvGrpSpPr>
+        <p:cNvPr id="1" name=""/>
+        <p:cNvGrpSpPr/>
+        <p:nvPr/>
+      </p:nvGrpSpPr>
+      <p:grpSpPr>
+        <a:xfrm>
+          <a:off x="0" y="0"/>
+          <a:ext cx="0" cy="0"/>
+          <a:chOff x="0" y="0"/>
+          <a:chExt cx="0" cy="0"/>
+        </a:xfrm>
+      </p:grpSpPr>
+      <p:sp>
+        <p:nvSpPr>
+          <p:cNvPr id="2" name="Title 1">
+            <a:extLst>
+              <a:ext uri="{FF2B5EF4-FFF2-40B4-BE49-F238E27FC236}">
+                <a16:creationId xmlns:a16="http://schemas.microsoft.com/office/drawing/2014/main" id="{8F3BFFF8-2A7E-615D-6D35-44737ED747F6}"/>
+              </a:ext>
+            </a:extLst>
+          </p:cNvPr>
+          <p:cNvSpPr>
+            <a:spLocks noGrp="1"/>
+          </p:cNvSpPr>
+          <p:nvPr>
+            <p:ph type="title"/>
+          </p:nvPr>
+        </p:nvSpPr>
+        <p:spPr>
+          <a:xfrm>
+            <a:off x="838200" y="365125"/>
+            <a:ext cx="5728956" cy="1357658"/>
+          </a:xfrm>
+        </p:spPr>
+        <p:txBody>
+          <a:bodyPr/>
+          <a:lstStyle/>
+          <a:p>
+            <a:r>
+              <a:rPr lang="en-US" dirty="0" err="1"/>
+              <a:t>Otte</a:t>
+            </a:r>
+            <a:r>
+              <a:rPr lang="en-US" dirty="0"/>
+              <a:t> &amp; </a:t>
+            </a:r>
+            <a:r>
+              <a:rPr lang="en-US" dirty="0" err="1"/>
+              <a:t>Chilonda</a:t>
+            </a:r>
+            <a:r>
+              <a:rPr lang="en-US" dirty="0"/>
+              <a:t> – arid, pastoral, goat </a:t>
+            </a:r>
+          </a:p>
+        </p:txBody>
+      </p:sp>
+      <p:sp>
+        <p:nvSpPr>
+          <p:cNvPr id="3" name="Content Placeholder 2">
+            <a:extLst>
+              <a:ext uri="{FF2B5EF4-FFF2-40B4-BE49-F238E27FC236}">
+                <a16:creationId xmlns:a16="http://schemas.microsoft.com/office/drawing/2014/main" id="{333B9EEB-FC77-2C63-D3B8-F7DB52535FCB}"/>
+              </a:ext>
+            </a:extLst>
+          </p:cNvPr>
+          <p:cNvSpPr>
+            <a:spLocks noGrp="1"/>
+          </p:cNvSpPr>
+          <p:nvPr>
+            <p:ph idx="1"/>
+          </p:nvPr>
+        </p:nvSpPr>
+        <p:spPr>
+          <a:xfrm>
+            <a:off x="838200" y="1825625"/>
+            <a:ext cx="3879574" cy="4351338"/>
+          </a:xfrm>
+        </p:spPr>
+        <p:txBody>
+          <a:bodyPr>
+            <a:normAutofit fontScale="85000" lnSpcReduction="10000"/>
+          </a:bodyPr>
+          <a:lstStyle/>
+          <a:p>
+            <a:r>
+              <a:rPr lang="en-US" dirty="0"/>
+              <a:t>Birth peaks at month 3 each year, lasting 4 weeks .</a:t>
+            </a:r>
+          </a:p>
+          <a:p>
+            <a:pPr lvl="1"/>
+            <a:r>
+              <a:rPr lang="en-US" dirty="0"/>
+              <a:t>Weeks 10-13 </a:t>
+            </a:r>
+          </a:p>
+          <a:p>
+            <a:r>
+              <a:rPr lang="en-US" dirty="0"/>
+              <a:t>OC Data – less good</a:t>
+            </a:r>
+          </a:p>
+          <a:p>
+            <a:r>
+              <a:rPr lang="en-US" dirty="0"/>
+              <a:t>Because proportions of animals fluctuate the actual numbers being removed from the population are larger?</a:t>
+            </a:r>
+          </a:p>
+          <a:p>
+            <a:r>
+              <a:rPr lang="en-US" dirty="0"/>
+              <a:t>Maybe also due to the model not being at stable state when initiated (NO &gt;&gt;&gt;)</a:t>
+            </a:r>
+          </a:p>
+        </p:txBody>
+      </p:sp>
+      <p:pic>
+        <p:nvPicPr>
+          <p:cNvPr id="4" name="Picture 3">
+            <a:extLst>
+              <a:ext uri="{FF2B5EF4-FFF2-40B4-BE49-F238E27FC236}">
+                <a16:creationId xmlns:a16="http://schemas.microsoft.com/office/drawing/2014/main" id="{865D99B9-8A51-1D64-3401-1EA440AC2B73}"/>
+              </a:ext>
+            </a:extLst>
+          </p:cNvPr>
+          <p:cNvPicPr>
+            <a:picLocks noChangeAspect="1"/>
+          </p:cNvPicPr>
+          <p:nvPr/>
+        </p:nvPicPr>
+        <p:blipFill>
+          <a:blip r:embed="rId2"/>
+          <a:stretch>
+            <a:fillRect/>
+          </a:stretch>
+        </p:blipFill>
+        <p:spPr>
+          <a:xfrm>
+            <a:off x="6567156" y="527204"/>
+            <a:ext cx="5349862" cy="3116717"/>
+          </a:xfrm>
+          <a:prstGeom prst="rect">
+            <a:avLst/>
+          </a:prstGeom>
+        </p:spPr>
+      </p:pic>
+      <p:pic>
+        <p:nvPicPr>
+          <p:cNvPr id="5" name="Picture 4">
+            <a:extLst>
+              <a:ext uri="{FF2B5EF4-FFF2-40B4-BE49-F238E27FC236}">
+                <a16:creationId xmlns:a16="http://schemas.microsoft.com/office/drawing/2014/main" id="{10E06B04-A5EE-6AEC-2663-E0BD0FF15AD8}"/>
+              </a:ext>
+            </a:extLst>
+          </p:cNvPr>
+          <p:cNvPicPr>
+            <a:picLocks noChangeAspect="1"/>
+          </p:cNvPicPr>
+          <p:nvPr/>
+        </p:nvPicPr>
+        <p:blipFill>
+          <a:blip r:embed="rId3"/>
+          <a:stretch>
+            <a:fillRect/>
+          </a:stretch>
+        </p:blipFill>
+        <p:spPr>
+          <a:xfrm>
+            <a:off x="6679095" y="3643921"/>
+            <a:ext cx="4838085" cy="3116717"/>
+          </a:xfrm>
+          <a:prstGeom prst="rect">
+            <a:avLst/>
+          </a:prstGeom>
+        </p:spPr>
+      </p:pic>
+    </p:spTree>
+    <p:extLst>
+      <p:ext uri="{BB962C8B-B14F-4D97-AF65-F5344CB8AC3E}">
+        <p14:creationId xmlns:p14="http://schemas.microsoft.com/office/powerpoint/2010/main" val="3268737595"/>
+      </p:ext>
+    </p:extLst>
+  </p:cSld>
+  <p:clrMapOvr>
+    <a:masterClrMapping/>
+  </p:clrMapOvr>
+</p:sld>
+</file>
+
+<file path=ppt/slides/slide4.xml><?xml version="1.0" encoding="utf-8"?>
+<p:sld xmlns:a="http://schemas.openxmlformats.org/drawingml/2006/main" xmlns:r="http://schemas.openxmlformats.org/officeDocument/2006/relationships" xmlns:p="http://schemas.openxmlformats.org/presentationml/2006/main">
+  <p:cSld>
+    <p:spTree>
+      <p:nvGrpSpPr>
+        <p:cNvPr id="1" name=""/>
+        <p:cNvGrpSpPr/>
+        <p:nvPr/>
+      </p:nvGrpSpPr>
+      <p:grpSpPr>
+        <a:xfrm>
+          <a:off x="0" y="0"/>
+          <a:ext cx="0" cy="0"/>
+          <a:chOff x="0" y="0"/>
+          <a:chExt cx="0" cy="0"/>
+        </a:xfrm>
+      </p:grpSpPr>
+      <p:sp>
+        <p:nvSpPr>
+          <p:cNvPr id="2" name="Title 1">
+            <a:extLst>
+              <a:ext uri="{FF2B5EF4-FFF2-40B4-BE49-F238E27FC236}">
+                <a16:creationId xmlns:a16="http://schemas.microsoft.com/office/drawing/2014/main" id="{8F3BFFF8-2A7E-615D-6D35-44737ED747F6}"/>
+              </a:ext>
+            </a:extLst>
+          </p:cNvPr>
+          <p:cNvSpPr>
+            <a:spLocks noGrp="1"/>
+          </p:cNvSpPr>
+          <p:nvPr>
+            <p:ph type="title"/>
+          </p:nvPr>
+        </p:nvSpPr>
+        <p:spPr>
+          <a:xfrm>
+            <a:off x="838200" y="365125"/>
+            <a:ext cx="5592417" cy="1325563"/>
+          </a:xfrm>
+        </p:spPr>
+        <p:txBody>
+          <a:bodyPr/>
+          <a:lstStyle/>
+          <a:p>
+            <a:r>
+              <a:rPr lang="en-US" dirty="0" err="1"/>
+              <a:t>Otte</a:t>
+            </a:r>
+            <a:r>
+              <a:rPr lang="en-US" dirty="0"/>
+              <a:t> &amp; </a:t>
+            </a:r>
+            <a:r>
+              <a:rPr lang="en-US" dirty="0" err="1"/>
+              <a:t>Chilonda</a:t>
+            </a:r>
+            <a:r>
+              <a:rPr lang="en-US" dirty="0"/>
+              <a:t> – Immunity Dynamics</a:t>
+            </a:r>
+          </a:p>
+        </p:txBody>
+      </p:sp>
+      <p:sp>
+        <p:nvSpPr>
+          <p:cNvPr id="3" name="Content Placeholder 2">
+            <a:extLst>
+              <a:ext uri="{FF2B5EF4-FFF2-40B4-BE49-F238E27FC236}">
+                <a16:creationId xmlns:a16="http://schemas.microsoft.com/office/drawing/2014/main" id="{333B9EEB-FC77-2C63-D3B8-F7DB52535FCB}"/>
+              </a:ext>
+            </a:extLst>
+          </p:cNvPr>
+          <p:cNvSpPr>
+            <a:spLocks noGrp="1"/>
+          </p:cNvSpPr>
+          <p:nvPr>
+            <p:ph idx="1"/>
+          </p:nvPr>
+        </p:nvSpPr>
+        <p:spPr>
+          <a:xfrm>
+            <a:off x="838200" y="1825625"/>
+            <a:ext cx="5257800" cy="4351338"/>
+          </a:xfrm>
+        </p:spPr>
+        <p:txBody>
+          <a:bodyPr>
+            <a:normAutofit lnSpcReduction="10000"/>
+          </a:bodyPr>
+          <a:lstStyle/>
+          <a:p>
+            <a:r>
+              <a:rPr lang="en-US" dirty="0"/>
+              <a:t>Vaccination begins at year 10</a:t>
+            </a:r>
+          </a:p>
+          <a:p>
+            <a:r>
+              <a:rPr lang="en-US" dirty="0"/>
+              <a:t>4 annual campaigns: y1-2: animals&gt;4m, y3-4: animals 4-12m</a:t>
+            </a:r>
+          </a:p>
+          <a:p>
+            <a:r>
+              <a:rPr lang="en-US" dirty="0"/>
+              <a:t>Vaccination occurs in 1</a:t>
+            </a:r>
+            <a:r>
+              <a:rPr lang="en-US" baseline="30000" dirty="0"/>
+              <a:t>st</a:t>
+            </a:r>
+            <a:r>
+              <a:rPr lang="en-US" dirty="0"/>
+              <a:t> month of year (weeks 520, 572, 624, 676) &amp; within 1 timestep (week)</a:t>
+            </a:r>
+          </a:p>
+          <a:p>
+            <a:r>
+              <a:rPr lang="en-US" dirty="0"/>
+              <a:t>Birth peak occurs at 3 months (week 10) ~ 9 weeks </a:t>
+            </a:r>
+            <a:r>
+              <a:rPr lang="en-US"/>
+              <a:t>post vaccination (weeks 530,582,634,686)</a:t>
+            </a:r>
+            <a:endParaRPr lang="en-US" dirty="0"/>
+          </a:p>
+        </p:txBody>
+      </p:sp>
+      <p:pic>
+        <p:nvPicPr>
+          <p:cNvPr id="6" name="Picture 5">
+            <a:extLst>
+              <a:ext uri="{FF2B5EF4-FFF2-40B4-BE49-F238E27FC236}">
+                <a16:creationId xmlns:a16="http://schemas.microsoft.com/office/drawing/2014/main" id="{25A5EC44-2B20-E12E-A85C-0F73686ECBB4}"/>
+              </a:ext>
+            </a:extLst>
+          </p:cNvPr>
+          <p:cNvPicPr>
+            <a:picLocks noChangeAspect="1"/>
+          </p:cNvPicPr>
+          <p:nvPr/>
+        </p:nvPicPr>
+        <p:blipFill>
+          <a:blip r:embed="rId2"/>
+          <a:stretch>
+            <a:fillRect/>
+          </a:stretch>
+        </p:blipFill>
+        <p:spPr>
+          <a:xfrm>
+            <a:off x="6410739" y="454870"/>
+            <a:ext cx="5592417" cy="3010712"/>
+          </a:xfrm>
+          <a:prstGeom prst="rect">
+            <a:avLst/>
+          </a:prstGeom>
+        </p:spPr>
+      </p:pic>
+      <p:pic>
+        <p:nvPicPr>
+          <p:cNvPr id="7" name="Picture 6">
+            <a:extLst>
+              <a:ext uri="{FF2B5EF4-FFF2-40B4-BE49-F238E27FC236}">
+                <a16:creationId xmlns:a16="http://schemas.microsoft.com/office/drawing/2014/main" id="{0D41C04C-5382-01A7-19E7-E493E198DE5D}"/>
+              </a:ext>
+            </a:extLst>
+          </p:cNvPr>
+          <p:cNvPicPr>
+            <a:picLocks noChangeAspect="1"/>
+          </p:cNvPicPr>
+          <p:nvPr/>
+        </p:nvPicPr>
+        <p:blipFill>
+          <a:blip r:embed="rId3"/>
+          <a:stretch>
+            <a:fillRect/>
+          </a:stretch>
+        </p:blipFill>
+        <p:spPr>
+          <a:xfrm>
+            <a:off x="6899412" y="3555327"/>
+            <a:ext cx="4615070" cy="3178980"/>
+          </a:xfrm>
+          <a:prstGeom prst="rect">
+            <a:avLst/>
+          </a:prstGeom>
+        </p:spPr>
+      </p:pic>
+    </p:spTree>
+    <p:extLst>
+      <p:ext uri="{BB962C8B-B14F-4D97-AF65-F5344CB8AC3E}">
+        <p14:creationId xmlns:p14="http://schemas.microsoft.com/office/powerpoint/2010/main" val="508195788"/>
       </p:ext>
     </p:extLst>
   </p:cSld>

</xml_diff>

<commit_message>
vaccination with seasonality plot edits
</commit_message>
<xml_diff>
--- a/presentations/seasonalbirths.pptx
+++ b/presentations/seasonalbirths.pptx
@@ -8,7 +8,11 @@
     <p:sldId id="256" r:id="rId2"/>
     <p:sldId id="257" r:id="rId3"/>
     <p:sldId id="258" r:id="rId4"/>
-    <p:sldId id="259" r:id="rId5"/>
+    <p:sldId id="263" r:id="rId5"/>
+    <p:sldId id="259" r:id="rId6"/>
+    <p:sldId id="260" r:id="rId7"/>
+    <p:sldId id="262" r:id="rId8"/>
+    <p:sldId id="261" r:id="rId9"/>
   </p:sldIdLst>
   <p:sldSz cx="12192000" cy="6858000"/>
   <p:notesSz cx="6858000" cy="9144000"/>
@@ -107,6 +111,11 @@
       </a:defRPr>
     </a:lvl9pPr>
   </p:defaultTextStyle>
+  <p:extLst>
+    <p:ext uri="{EFAFB233-063F-42B5-8137-9DF3F51BA10A}">
+      <p15:sldGuideLst xmlns:p15="http://schemas.microsoft.com/office/powerpoint/2012/main"/>
+    </p:ext>
+  </p:extLst>
 </p:presentation>
 </file>
 
@@ -259,7 +268,7 @@
           <a:p>
             <a:fld id="{160C4477-7D68-5C4F-9EA8-46034050927E}" type="datetimeFigureOut">
               <a:rPr lang="en-US" smtClean="0"/>
-              <a:t>12/6/23</a:t>
+              <a:t>12/7/23</a:t>
             </a:fld>
             <a:endParaRPr lang="en-US"/>
           </a:p>
@@ -459,7 +468,7 @@
           <a:p>
             <a:fld id="{160C4477-7D68-5C4F-9EA8-46034050927E}" type="datetimeFigureOut">
               <a:rPr lang="en-US" smtClean="0"/>
-              <a:t>12/6/23</a:t>
+              <a:t>12/7/23</a:t>
             </a:fld>
             <a:endParaRPr lang="en-US"/>
           </a:p>
@@ -669,7 +678,7 @@
           <a:p>
             <a:fld id="{160C4477-7D68-5C4F-9EA8-46034050927E}" type="datetimeFigureOut">
               <a:rPr lang="en-US" smtClean="0"/>
-              <a:t>12/6/23</a:t>
+              <a:t>12/7/23</a:t>
             </a:fld>
             <a:endParaRPr lang="en-US"/>
           </a:p>
@@ -869,7 +878,7 @@
           <a:p>
             <a:fld id="{160C4477-7D68-5C4F-9EA8-46034050927E}" type="datetimeFigureOut">
               <a:rPr lang="en-US" smtClean="0"/>
-              <a:t>12/6/23</a:t>
+              <a:t>12/7/23</a:t>
             </a:fld>
             <a:endParaRPr lang="en-US"/>
           </a:p>
@@ -1145,7 +1154,7 @@
           <a:p>
             <a:fld id="{160C4477-7D68-5C4F-9EA8-46034050927E}" type="datetimeFigureOut">
               <a:rPr lang="en-US" smtClean="0"/>
-              <a:t>12/6/23</a:t>
+              <a:t>12/7/23</a:t>
             </a:fld>
             <a:endParaRPr lang="en-US"/>
           </a:p>
@@ -1413,7 +1422,7 @@
           <a:p>
             <a:fld id="{160C4477-7D68-5C4F-9EA8-46034050927E}" type="datetimeFigureOut">
               <a:rPr lang="en-US" smtClean="0"/>
-              <a:t>12/6/23</a:t>
+              <a:t>12/7/23</a:t>
             </a:fld>
             <a:endParaRPr lang="en-US"/>
           </a:p>
@@ -1828,7 +1837,7 @@
           <a:p>
             <a:fld id="{160C4477-7D68-5C4F-9EA8-46034050927E}" type="datetimeFigureOut">
               <a:rPr lang="en-US" smtClean="0"/>
-              <a:t>12/6/23</a:t>
+              <a:t>12/7/23</a:t>
             </a:fld>
             <a:endParaRPr lang="en-US"/>
           </a:p>
@@ -1970,7 +1979,7 @@
           <a:p>
             <a:fld id="{160C4477-7D68-5C4F-9EA8-46034050927E}" type="datetimeFigureOut">
               <a:rPr lang="en-US" smtClean="0"/>
-              <a:t>12/6/23</a:t>
+              <a:t>12/7/23</a:t>
             </a:fld>
             <a:endParaRPr lang="en-US"/>
           </a:p>
@@ -2083,7 +2092,7 @@
           <a:p>
             <a:fld id="{160C4477-7D68-5C4F-9EA8-46034050927E}" type="datetimeFigureOut">
               <a:rPr lang="en-US" smtClean="0"/>
-              <a:t>12/6/23</a:t>
+              <a:t>12/7/23</a:t>
             </a:fld>
             <a:endParaRPr lang="en-US"/>
           </a:p>
@@ -2396,7 +2405,7 @@
           <a:p>
             <a:fld id="{160C4477-7D68-5C4F-9EA8-46034050927E}" type="datetimeFigureOut">
               <a:rPr lang="en-US" smtClean="0"/>
-              <a:t>12/6/23</a:t>
+              <a:t>12/7/23</a:t>
             </a:fld>
             <a:endParaRPr lang="en-US"/>
           </a:p>
@@ -2685,7 +2694,7 @@
           <a:p>
             <a:fld id="{160C4477-7D68-5C4F-9EA8-46034050927E}" type="datetimeFigureOut">
               <a:rPr lang="en-US" smtClean="0"/>
-              <a:t>12/6/23</a:t>
+              <a:t>12/7/23</a:t>
             </a:fld>
             <a:endParaRPr lang="en-US"/>
           </a:p>
@@ -2928,7 +2937,7 @@
           <a:p>
             <a:fld id="{160C4477-7D68-5C4F-9EA8-46034050927E}" type="datetimeFigureOut">
               <a:rPr lang="en-US" smtClean="0"/>
-              <a:t>12/6/23</a:t>
+              <a:t>12/7/23</a:t>
             </a:fld>
             <a:endParaRPr lang="en-US"/>
           </a:p>
@@ -3802,7 +3811,7 @@
           <p:cNvPr id="2" name="Title 1">
             <a:extLst>
               <a:ext uri="{FF2B5EF4-FFF2-40B4-BE49-F238E27FC236}">
-                <a16:creationId xmlns:a16="http://schemas.microsoft.com/office/drawing/2014/main" id="{8F3BFFF8-2A7E-615D-6D35-44737ED747F6}"/>
+                <a16:creationId xmlns:a16="http://schemas.microsoft.com/office/drawing/2014/main" id="{F3C3BC25-D8AE-A48B-1565-9BCA21FE8347}"/>
               </a:ext>
             </a:extLst>
           </p:cNvPr>
@@ -3811,100 +3820,270 @@
           </p:cNvSpPr>
           <p:nvPr>
             <p:ph type="title"/>
+          </p:nvPr>
+        </p:nvSpPr>
+        <p:spPr/>
+        <p:txBody>
+          <a:bodyPr/>
+          <a:lstStyle/>
+          <a:p>
+            <a:r>
+              <a:rPr lang="en-US" dirty="0"/>
+              <a:t>Immunity Dynamics with Seasonality – </a:t>
+            </a:r>
+            <a:r>
+              <a:rPr lang="en-US" dirty="0" err="1"/>
+              <a:t>Otte</a:t>
+            </a:r>
+            <a:r>
+              <a:rPr lang="en-US" dirty="0"/>
+              <a:t> &amp; </a:t>
+            </a:r>
+            <a:r>
+              <a:rPr lang="en-US" dirty="0" err="1"/>
+              <a:t>Chilonda</a:t>
+            </a:r>
+            <a:r>
+              <a:rPr lang="en-US" dirty="0"/>
+              <a:t> example</a:t>
+            </a:r>
+          </a:p>
+        </p:txBody>
+      </p:sp>
+      <p:sp>
+        <p:nvSpPr>
+          <p:cNvPr id="3" name="Content Placeholder 2">
+            <a:extLst>
+              <a:ext uri="{FF2B5EF4-FFF2-40B4-BE49-F238E27FC236}">
+                <a16:creationId xmlns:a16="http://schemas.microsoft.com/office/drawing/2014/main" id="{9BDD47E9-2585-4683-61F4-92357C5171D3}"/>
+              </a:ext>
+            </a:extLst>
+          </p:cNvPr>
+          <p:cNvSpPr>
+            <a:spLocks noGrp="1"/>
+          </p:cNvSpPr>
+          <p:nvPr>
+            <p:ph idx="1"/>
+          </p:nvPr>
+        </p:nvSpPr>
+        <p:spPr/>
+        <p:txBody>
+          <a:bodyPr>
+            <a:normAutofit fontScale="55000" lnSpcReduction="20000"/>
+          </a:bodyPr>
+          <a:lstStyle/>
+          <a:p>
+            <a:r>
+              <a:rPr lang="en-US" dirty="0"/>
+              <a:t>Parameter sets: </a:t>
+            </a:r>
+          </a:p>
+          <a:p>
+            <a:pPr lvl="1"/>
+            <a:r>
+              <a:rPr lang="en-US" dirty="0"/>
+              <a:t>Generated by LHS of reported ranges for different flock types in O&amp;C</a:t>
+            </a:r>
+          </a:p>
+          <a:p>
+            <a:pPr lvl="1"/>
+            <a:r>
+              <a:rPr lang="en-US" dirty="0"/>
+              <a:t>“Validated” against flock growth &amp; age-sex structure conditions</a:t>
+            </a:r>
+          </a:p>
+          <a:p>
+            <a:pPr lvl="1"/>
+            <a:r>
+              <a:rPr lang="en-US" dirty="0"/>
+              <a:t>Parameter sets which failed satisfy conditions were discarded.</a:t>
+            </a:r>
+          </a:p>
+          <a:p>
+            <a:r>
+              <a:rPr lang="en-US" dirty="0"/>
+              <a:t>Births:</a:t>
+            </a:r>
+          </a:p>
+          <a:p>
+            <a:pPr lvl="1"/>
+            <a:r>
+              <a:rPr lang="en-US" dirty="0"/>
+              <a:t>Seasonal birth peaks: 70% aggregated in 4-week period (30% spread throughout rest of year)</a:t>
+            </a:r>
+          </a:p>
+          <a:p>
+            <a:pPr lvl="1"/>
+            <a:r>
+              <a:rPr lang="en-US" dirty="0"/>
+              <a:t>Seasonality implemented from 5 years into simulation</a:t>
+            </a:r>
+          </a:p>
+          <a:p>
+            <a:pPr lvl="1"/>
+            <a:r>
+              <a:rPr lang="en-US" dirty="0"/>
+              <a:t>Occurrence of peak at months: 3, 6, 9, 12</a:t>
+            </a:r>
+          </a:p>
+          <a:p>
+            <a:pPr lvl="1"/>
+            <a:r>
+              <a:rPr lang="en-US" dirty="0"/>
+              <a:t>Include non-seasonal example</a:t>
+            </a:r>
+          </a:p>
+          <a:p>
+            <a:r>
+              <a:rPr lang="en-US" dirty="0"/>
+              <a:t>Vaccination: </a:t>
+            </a:r>
+          </a:p>
+          <a:p>
+            <a:pPr lvl="1"/>
+            <a:r>
+              <a:rPr lang="en-US" dirty="0"/>
+              <a:t>At mid-point (10y), </a:t>
+            </a:r>
+          </a:p>
+          <a:p>
+            <a:pPr lvl="1"/>
+            <a:r>
+              <a:rPr lang="en-US" dirty="0" err="1"/>
+              <a:t>pV</a:t>
+            </a:r>
+            <a:r>
+              <a:rPr lang="en-US" dirty="0"/>
+              <a:t> = 1</a:t>
+            </a:r>
+          </a:p>
+          <a:p>
+            <a:pPr lvl="1"/>
+            <a:r>
+              <a:rPr lang="en-US" dirty="0"/>
+              <a:t>4 year strategy</a:t>
+            </a:r>
+          </a:p>
+          <a:p>
+            <a:pPr lvl="1"/>
+            <a:r>
+              <a:rPr lang="en-US" dirty="0"/>
+              <a:t>Immunity metrics for 1</a:t>
+            </a:r>
+            <a:r>
+              <a:rPr lang="en-US" baseline="30000" dirty="0"/>
+              <a:t>st</a:t>
+            </a:r>
+            <a:r>
+              <a:rPr lang="en-US" dirty="0"/>
+              <a:t> campaign</a:t>
+            </a:r>
+          </a:p>
+          <a:p>
+            <a:r>
+              <a:rPr lang="en-US" dirty="0"/>
+              <a:t>Simulation:</a:t>
+            </a:r>
+          </a:p>
+          <a:p>
+            <a:pPr lvl="1"/>
+            <a:r>
+              <a:rPr lang="en-US" dirty="0"/>
+              <a:t>20y</a:t>
+            </a:r>
+          </a:p>
+          <a:p>
+            <a:pPr lvl="1"/>
+            <a:r>
+              <a:rPr lang="en-US" dirty="0"/>
+              <a:t>All animals initially S</a:t>
+            </a:r>
+          </a:p>
+          <a:p>
+            <a:pPr lvl="1"/>
+            <a:r>
+              <a:rPr lang="en-US" dirty="0"/>
+              <a:t>Maternal immunity included (and included in reported immunity rates)</a:t>
+            </a:r>
+          </a:p>
+        </p:txBody>
+      </p:sp>
+    </p:spTree>
+    <p:extLst>
+      <p:ext uri="{BB962C8B-B14F-4D97-AF65-F5344CB8AC3E}">
+        <p14:creationId xmlns:p14="http://schemas.microsoft.com/office/powerpoint/2010/main" val="1901907063"/>
+      </p:ext>
+    </p:extLst>
+  </p:cSld>
+  <p:clrMapOvr>
+    <a:masterClrMapping/>
+  </p:clrMapOvr>
+</p:sld>
+</file>
+
+<file path=ppt/slides/slide5.xml><?xml version="1.0" encoding="utf-8"?>
+<p:sld xmlns:a="http://schemas.openxmlformats.org/drawingml/2006/main" xmlns:r="http://schemas.openxmlformats.org/officeDocument/2006/relationships" xmlns:p="http://schemas.openxmlformats.org/presentationml/2006/main">
+  <p:cSld>
+    <p:spTree>
+      <p:nvGrpSpPr>
+        <p:cNvPr id="1" name=""/>
+        <p:cNvGrpSpPr/>
+        <p:nvPr/>
+      </p:nvGrpSpPr>
+      <p:grpSpPr>
+        <a:xfrm>
+          <a:off x="0" y="0"/>
+          <a:ext cx="0" cy="0"/>
+          <a:chOff x="0" y="0"/>
+          <a:chExt cx="0" cy="0"/>
+        </a:xfrm>
+      </p:grpSpPr>
+      <p:sp>
+        <p:nvSpPr>
+          <p:cNvPr id="3" name="Content Placeholder 2">
+            <a:extLst>
+              <a:ext uri="{FF2B5EF4-FFF2-40B4-BE49-F238E27FC236}">
+                <a16:creationId xmlns:a16="http://schemas.microsoft.com/office/drawing/2014/main" id="{333B9EEB-FC77-2C63-D3B8-F7DB52535FCB}"/>
+              </a:ext>
+            </a:extLst>
+          </p:cNvPr>
+          <p:cNvSpPr>
+            <a:spLocks noGrp="1"/>
+          </p:cNvSpPr>
+          <p:nvPr>
+            <p:ph idx="1"/>
           </p:nvPr>
         </p:nvSpPr>
         <p:spPr>
           <a:xfrm>
-            <a:off x="838200" y="365125"/>
-            <a:ext cx="5592417" cy="1325563"/>
+            <a:off x="838198" y="418289"/>
+            <a:ext cx="10313277" cy="916526"/>
           </a:xfrm>
         </p:spPr>
         <p:txBody>
-          <a:bodyPr/>
-          <a:lstStyle/>
-          <a:p>
-            <a:r>
-              <a:rPr lang="en-US" dirty="0" err="1"/>
-              <a:t>Otte</a:t>
-            </a:r>
-            <a:r>
-              <a:rPr lang="en-US" dirty="0"/>
-              <a:t> &amp; </a:t>
-            </a:r>
-            <a:r>
-              <a:rPr lang="en-US" dirty="0" err="1"/>
-              <a:t>Chilonda</a:t>
-            </a:r>
-            <a:r>
-              <a:rPr lang="en-US" dirty="0"/>
-              <a:t> – Immunity Dynamics</a:t>
-            </a:r>
-          </a:p>
-        </p:txBody>
-      </p:sp>
-      <p:sp>
-        <p:nvSpPr>
-          <p:cNvPr id="3" name="Content Placeholder 2">
-            <a:extLst>
-              <a:ext uri="{FF2B5EF4-FFF2-40B4-BE49-F238E27FC236}">
-                <a16:creationId xmlns:a16="http://schemas.microsoft.com/office/drawing/2014/main" id="{333B9EEB-FC77-2C63-D3B8-F7DB52535FCB}"/>
-              </a:ext>
-            </a:extLst>
-          </p:cNvPr>
-          <p:cNvSpPr>
-            <a:spLocks noGrp="1"/>
-          </p:cNvSpPr>
-          <p:nvPr>
-            <p:ph idx="1"/>
-          </p:nvPr>
-        </p:nvSpPr>
-        <p:spPr>
-          <a:xfrm>
-            <a:off x="838200" y="1825625"/>
-            <a:ext cx="5257800" cy="4351338"/>
-          </a:xfrm>
-        </p:spPr>
-        <p:txBody>
           <a:bodyPr>
-            <a:normAutofit lnSpcReduction="10000"/>
+            <a:normAutofit/>
           </a:bodyPr>
           <a:lstStyle/>
           <a:p>
             <a:r>
-              <a:rPr lang="en-US" dirty="0"/>
-              <a:t>Vaccination begins at year 10</a:t>
-            </a:r>
-          </a:p>
-          <a:p>
-            <a:r>
-              <a:rPr lang="en-US" dirty="0"/>
-              <a:t>4 annual campaigns: y1-2: animals&gt;4m, y3-4: animals 4-12m</a:t>
-            </a:r>
-          </a:p>
-          <a:p>
-            <a:r>
-              <a:rPr lang="en-US" dirty="0"/>
-              <a:t>Vaccination occurs in 1</a:t>
-            </a:r>
-            <a:r>
-              <a:rPr lang="en-US" baseline="30000" dirty="0"/>
+              <a:rPr lang="en-US" sz="2000" dirty="0"/>
+              <a:t>Vaccination in 1</a:t>
+            </a:r>
+            <a:r>
+              <a:rPr lang="en-US" sz="2000" baseline="30000" dirty="0"/>
               <a:t>st</a:t>
             </a:r>
             <a:r>
-              <a:rPr lang="en-US" dirty="0"/>
+              <a:rPr lang="en-US" sz="2000" dirty="0"/>
               <a:t> month of year (weeks 520, 572, 624, 676) &amp; within 1 timestep (week)</a:t>
             </a:r>
           </a:p>
           <a:p>
             <a:r>
-              <a:rPr lang="en-US" dirty="0"/>
-              <a:t>Birth peak occurs at 3 months (week 10) ~ 9 weeks </a:t>
-            </a:r>
-            <a:r>
-              <a:rPr lang="en-US"/>
-              <a:t>post vaccination (weeks 530,582,634,686)</a:t>
-            </a:r>
-            <a:endParaRPr lang="en-US" dirty="0"/>
+              <a:rPr lang="en-US" sz="2000" dirty="0"/>
+              <a:t>Birth peak at 3rd month (week 10) ~ (weeks 530,582,634,686) &amp; over 4 week period</a:t>
+            </a:r>
           </a:p>
         </p:txBody>
       </p:sp>
@@ -3930,8 +4109,8 @@
         </p:blipFill>
         <p:spPr>
           <a:xfrm>
-            <a:off x="6410739" y="454870"/>
-            <a:ext cx="5592417" cy="3010712"/>
+            <a:off x="838198" y="1526627"/>
+            <a:ext cx="6061214" cy="3263092"/>
           </a:xfrm>
           <a:prstGeom prst="rect">
             <a:avLst/>
@@ -3944,6 +4123,204 @@
             <a:extLst>
               <a:ext uri="{FF2B5EF4-FFF2-40B4-BE49-F238E27FC236}">
                 <a16:creationId xmlns:a16="http://schemas.microsoft.com/office/drawing/2014/main" id="{0D41C04C-5382-01A7-19E7-E493E198DE5D}"/>
+              </a:ext>
+            </a:extLst>
+          </p:cNvPr>
+          <p:cNvPicPr>
+            <a:picLocks noChangeAspect="1"/>
+          </p:cNvPicPr>
+          <p:nvPr/>
+        </p:nvPicPr>
+        <p:blipFill rotWithShape="1">
+          <a:blip r:embed="rId3"/>
+          <a:srcRect r="11488"/>
+          <a:stretch/>
+        </p:blipFill>
+        <p:spPr>
+          <a:xfrm>
+            <a:off x="7062952" y="3004339"/>
+            <a:ext cx="4635062" cy="3607140"/>
+          </a:xfrm>
+          <a:prstGeom prst="rect">
+            <a:avLst/>
+          </a:prstGeom>
+        </p:spPr>
+      </p:pic>
+    </p:spTree>
+    <p:extLst>
+      <p:ext uri="{BB962C8B-B14F-4D97-AF65-F5344CB8AC3E}">
+        <p14:creationId xmlns:p14="http://schemas.microsoft.com/office/powerpoint/2010/main" val="508195788"/>
+      </p:ext>
+    </p:extLst>
+  </p:cSld>
+  <p:clrMapOvr>
+    <a:masterClrMapping/>
+  </p:clrMapOvr>
+</p:sld>
+</file>
+
+<file path=ppt/slides/slide6.xml><?xml version="1.0" encoding="utf-8"?>
+<p:sld xmlns:a="http://schemas.openxmlformats.org/drawingml/2006/main" xmlns:r="http://schemas.openxmlformats.org/officeDocument/2006/relationships" xmlns:p="http://schemas.openxmlformats.org/presentationml/2006/main">
+  <p:cSld>
+    <p:spTree>
+      <p:nvGrpSpPr>
+        <p:cNvPr id="1" name=""/>
+        <p:cNvGrpSpPr/>
+        <p:nvPr/>
+      </p:nvGrpSpPr>
+      <p:grpSpPr>
+        <a:xfrm>
+          <a:off x="0" y="0"/>
+          <a:ext cx="0" cy="0"/>
+          <a:chOff x="0" y="0"/>
+          <a:chExt cx="0" cy="0"/>
+        </a:xfrm>
+      </p:grpSpPr>
+      <p:pic>
+        <p:nvPicPr>
+          <p:cNvPr id="4" name="Picture 3">
+            <a:extLst>
+              <a:ext uri="{FF2B5EF4-FFF2-40B4-BE49-F238E27FC236}">
+                <a16:creationId xmlns:a16="http://schemas.microsoft.com/office/drawing/2014/main" id="{DD66CF57-87EE-0988-3AA2-69387EEBA263}"/>
+              </a:ext>
+            </a:extLst>
+          </p:cNvPr>
+          <p:cNvPicPr>
+            <a:picLocks noChangeAspect="1"/>
+          </p:cNvPicPr>
+          <p:nvPr/>
+        </p:nvPicPr>
+        <p:blipFill>
+          <a:blip r:embed="rId2"/>
+          <a:stretch>
+            <a:fillRect/>
+          </a:stretch>
+        </p:blipFill>
+        <p:spPr>
+          <a:xfrm>
+            <a:off x="698938" y="1223397"/>
+            <a:ext cx="10515600" cy="4411206"/>
+          </a:xfrm>
+          <a:prstGeom prst="rect">
+            <a:avLst/>
+          </a:prstGeom>
+        </p:spPr>
+      </p:pic>
+      <p:sp>
+        <p:nvSpPr>
+          <p:cNvPr id="6" name="TextBox 5">
+            <a:extLst>
+              <a:ext uri="{FF2B5EF4-FFF2-40B4-BE49-F238E27FC236}">
+                <a16:creationId xmlns:a16="http://schemas.microsoft.com/office/drawing/2014/main" id="{3B1B377E-485F-CE16-9C54-01BA22E0069F}"/>
+              </a:ext>
+            </a:extLst>
+          </p:cNvPr>
+          <p:cNvSpPr txBox="1"/>
+          <p:nvPr/>
+        </p:nvSpPr>
+        <p:spPr>
+          <a:xfrm>
+            <a:off x="977462" y="414083"/>
+            <a:ext cx="10237076" cy="646331"/>
+          </a:xfrm>
+          <a:prstGeom prst="rect">
+            <a:avLst/>
+          </a:prstGeom>
+          <a:noFill/>
+        </p:spPr>
+        <p:txBody>
+          <a:bodyPr wrap="square">
+            <a:spAutoFit/>
+          </a:bodyPr>
+          <a:lstStyle/>
+          <a:p>
+            <a:r>
+              <a:rPr lang="en-US" dirty="0"/>
+              <a:t>Vaccination occurs in 1</a:t>
+            </a:r>
+            <a:r>
+              <a:rPr lang="en-US" baseline="30000" dirty="0"/>
+              <a:t>st</a:t>
+            </a:r>
+            <a:r>
+              <a:rPr lang="en-US" dirty="0"/>
+              <a:t> month of year (weeks 520, 572, 624, 676) &amp; within 1 timestep (week)</a:t>
+            </a:r>
+          </a:p>
+          <a:p>
+            <a:r>
+              <a:rPr lang="en-US" dirty="0"/>
+              <a:t>Birth peak occurs at 3 months (week 10) ~ 9 weeks post vaccination (weeks 530,582,634,686)</a:t>
+            </a:r>
+          </a:p>
+        </p:txBody>
+      </p:sp>
+    </p:spTree>
+    <p:extLst>
+      <p:ext uri="{BB962C8B-B14F-4D97-AF65-F5344CB8AC3E}">
+        <p14:creationId xmlns:p14="http://schemas.microsoft.com/office/powerpoint/2010/main" val="1208015421"/>
+      </p:ext>
+    </p:extLst>
+  </p:cSld>
+  <p:clrMapOvr>
+    <a:masterClrMapping/>
+  </p:clrMapOvr>
+</p:sld>
+</file>
+
+<file path=ppt/slides/slide7.xml><?xml version="1.0" encoding="utf-8"?>
+<p:sld xmlns:a="http://schemas.openxmlformats.org/drawingml/2006/main" xmlns:r="http://schemas.openxmlformats.org/officeDocument/2006/relationships" xmlns:p="http://schemas.openxmlformats.org/presentationml/2006/main">
+  <p:cSld>
+    <p:spTree>
+      <p:nvGrpSpPr>
+        <p:cNvPr id="1" name=""/>
+        <p:cNvGrpSpPr/>
+        <p:nvPr/>
+      </p:nvGrpSpPr>
+      <p:grpSpPr>
+        <a:xfrm>
+          <a:off x="0" y="0"/>
+          <a:ext cx="0" cy="0"/>
+          <a:chOff x="0" y="0"/>
+          <a:chExt cx="0" cy="0"/>
+        </a:xfrm>
+      </p:grpSpPr>
+      <p:pic>
+        <p:nvPicPr>
+          <p:cNvPr id="5" name="Picture 4">
+            <a:extLst>
+              <a:ext uri="{FF2B5EF4-FFF2-40B4-BE49-F238E27FC236}">
+                <a16:creationId xmlns:a16="http://schemas.microsoft.com/office/drawing/2014/main" id="{3207080B-31F1-4D19-20D4-D8AEFA7B7A47}"/>
+              </a:ext>
+            </a:extLst>
+          </p:cNvPr>
+          <p:cNvPicPr>
+            <a:picLocks noChangeAspect="1"/>
+          </p:cNvPicPr>
+          <p:nvPr/>
+        </p:nvPicPr>
+        <p:blipFill>
+          <a:blip r:embed="rId2"/>
+          <a:stretch>
+            <a:fillRect/>
+          </a:stretch>
+        </p:blipFill>
+        <p:spPr>
+          <a:xfrm>
+            <a:off x="4454305" y="86516"/>
+            <a:ext cx="5456950" cy="6684968"/>
+          </a:xfrm>
+          <a:prstGeom prst="rect">
+            <a:avLst/>
+          </a:prstGeom>
+        </p:spPr>
+      </p:pic>
+      <p:pic>
+        <p:nvPicPr>
+          <p:cNvPr id="9" name="Picture 8">
+            <a:extLst>
+              <a:ext uri="{FF2B5EF4-FFF2-40B4-BE49-F238E27FC236}">
+                <a16:creationId xmlns:a16="http://schemas.microsoft.com/office/drawing/2014/main" id="{AA451CC8-E500-61D4-135D-B6EE450D7CB6}"/>
               </a:ext>
             </a:extLst>
           </p:cNvPr>
@@ -3960,8 +4337,341 @@
         </p:blipFill>
         <p:spPr>
           <a:xfrm>
-            <a:off x="6899412" y="3555327"/>
-            <a:ext cx="4615070" cy="3178980"/>
+            <a:off x="1955527" y="118046"/>
+            <a:ext cx="2259121" cy="6618863"/>
+          </a:xfrm>
+          <a:prstGeom prst="rect">
+            <a:avLst/>
+          </a:prstGeom>
+        </p:spPr>
+      </p:pic>
+      <p:sp>
+        <p:nvSpPr>
+          <p:cNvPr id="10" name="Rectangle 9">
+            <a:extLst>
+              <a:ext uri="{FF2B5EF4-FFF2-40B4-BE49-F238E27FC236}">
+                <a16:creationId xmlns:a16="http://schemas.microsoft.com/office/drawing/2014/main" id="{12F685AE-C561-E3B3-0870-E488F16B052F}"/>
+              </a:ext>
+            </a:extLst>
+          </p:cNvPr>
+          <p:cNvSpPr/>
+          <p:nvPr/>
+        </p:nvSpPr>
+        <p:spPr>
+          <a:xfrm>
+            <a:off x="9375228" y="118045"/>
+            <a:ext cx="294289" cy="6492961"/>
+          </a:xfrm>
+          <a:prstGeom prst="rect">
+            <a:avLst/>
+          </a:prstGeom>
+          <a:noFill/>
+          <a:ln w="28575" cap="flat" cmpd="sng" algn="ctr">
+            <a:solidFill>
+              <a:schemeClr val="accent2"/>
+            </a:solidFill>
+            <a:prstDash val="solid"/>
+            <a:round/>
+            <a:headEnd type="none" w="med" len="med"/>
+            <a:tailEnd type="none" w="med" len="med"/>
+          </a:ln>
+        </p:spPr>
+        <p:style>
+          <a:lnRef idx="0">
+            <a:scrgbClr r="0" g="0" b="0"/>
+          </a:lnRef>
+          <a:fillRef idx="0">
+            <a:scrgbClr r="0" g="0" b="0"/>
+          </a:fillRef>
+          <a:effectRef idx="0">
+            <a:scrgbClr r="0" g="0" b="0"/>
+          </a:effectRef>
+          <a:fontRef idx="minor">
+            <a:schemeClr val="accent2"/>
+          </a:fontRef>
+        </p:style>
+        <p:txBody>
+          <a:bodyPr rtlCol="0" anchor="ctr"/>
+          <a:lstStyle/>
+          <a:p>
+            <a:pPr algn="ctr"/>
+            <a:endParaRPr lang="en-US"/>
+          </a:p>
+        </p:txBody>
+      </p:sp>
+      <p:sp>
+        <p:nvSpPr>
+          <p:cNvPr id="11" name="Rectangle 10">
+            <a:extLst>
+              <a:ext uri="{FF2B5EF4-FFF2-40B4-BE49-F238E27FC236}">
+                <a16:creationId xmlns:a16="http://schemas.microsoft.com/office/drawing/2014/main" id="{C15700CE-3E7A-39D3-09C3-9BD01E93F7A9}"/>
+              </a:ext>
+            </a:extLst>
+          </p:cNvPr>
+          <p:cNvSpPr/>
+          <p:nvPr/>
+        </p:nvSpPr>
+        <p:spPr>
+          <a:xfrm>
+            <a:off x="7719849" y="118045"/>
+            <a:ext cx="294289" cy="6492961"/>
+          </a:xfrm>
+          <a:prstGeom prst="rect">
+            <a:avLst/>
+          </a:prstGeom>
+          <a:noFill/>
+          <a:ln w="28575" cap="flat" cmpd="sng" algn="ctr">
+            <a:solidFill>
+              <a:schemeClr val="accent2"/>
+            </a:solidFill>
+            <a:prstDash val="solid"/>
+            <a:round/>
+            <a:headEnd type="none" w="med" len="med"/>
+            <a:tailEnd type="none" w="med" len="med"/>
+          </a:ln>
+        </p:spPr>
+        <p:style>
+          <a:lnRef idx="0">
+            <a:scrgbClr r="0" g="0" b="0"/>
+          </a:lnRef>
+          <a:fillRef idx="0">
+            <a:scrgbClr r="0" g="0" b="0"/>
+          </a:fillRef>
+          <a:effectRef idx="0">
+            <a:scrgbClr r="0" g="0" b="0"/>
+          </a:effectRef>
+          <a:fontRef idx="minor">
+            <a:schemeClr val="accent2"/>
+          </a:fontRef>
+        </p:style>
+        <p:txBody>
+          <a:bodyPr rtlCol="0" anchor="ctr"/>
+          <a:lstStyle/>
+          <a:p>
+            <a:pPr algn="ctr"/>
+            <a:endParaRPr lang="en-US"/>
+          </a:p>
+        </p:txBody>
+      </p:sp>
+      <p:sp>
+        <p:nvSpPr>
+          <p:cNvPr id="12" name="Rectangle 11">
+            <a:extLst>
+              <a:ext uri="{FF2B5EF4-FFF2-40B4-BE49-F238E27FC236}">
+                <a16:creationId xmlns:a16="http://schemas.microsoft.com/office/drawing/2014/main" id="{945E7C7E-04A3-EDC9-81C7-9DACBCE38444}"/>
+              </a:ext>
+            </a:extLst>
+          </p:cNvPr>
+          <p:cNvSpPr/>
+          <p:nvPr/>
+        </p:nvSpPr>
+        <p:spPr>
+          <a:xfrm>
+            <a:off x="6074980" y="118044"/>
+            <a:ext cx="294289" cy="6492961"/>
+          </a:xfrm>
+          <a:prstGeom prst="rect">
+            <a:avLst/>
+          </a:prstGeom>
+          <a:noFill/>
+          <a:ln w="28575" cap="flat" cmpd="sng" algn="ctr">
+            <a:solidFill>
+              <a:schemeClr val="accent2"/>
+            </a:solidFill>
+            <a:prstDash val="solid"/>
+            <a:round/>
+            <a:headEnd type="none" w="med" len="med"/>
+            <a:tailEnd type="none" w="med" len="med"/>
+          </a:ln>
+        </p:spPr>
+        <p:style>
+          <a:lnRef idx="0">
+            <a:scrgbClr r="0" g="0" b="0"/>
+          </a:lnRef>
+          <a:fillRef idx="0">
+            <a:scrgbClr r="0" g="0" b="0"/>
+          </a:fillRef>
+          <a:effectRef idx="0">
+            <a:scrgbClr r="0" g="0" b="0"/>
+          </a:effectRef>
+          <a:fontRef idx="minor">
+            <a:schemeClr val="accent2"/>
+          </a:fontRef>
+        </p:style>
+        <p:txBody>
+          <a:bodyPr rtlCol="0" anchor="ctr"/>
+          <a:lstStyle/>
+          <a:p>
+            <a:pPr algn="ctr"/>
+            <a:endParaRPr lang="en-US"/>
+          </a:p>
+        </p:txBody>
+      </p:sp>
+      <p:sp>
+        <p:nvSpPr>
+          <p:cNvPr id="13" name="Rectangle 12">
+            <a:extLst>
+              <a:ext uri="{FF2B5EF4-FFF2-40B4-BE49-F238E27FC236}">
+                <a16:creationId xmlns:a16="http://schemas.microsoft.com/office/drawing/2014/main" id="{E40E2120-B9F3-F4FE-9A1D-9E478736C922}"/>
+              </a:ext>
+            </a:extLst>
+          </p:cNvPr>
+          <p:cNvSpPr/>
+          <p:nvPr/>
+        </p:nvSpPr>
+        <p:spPr>
+          <a:xfrm>
+            <a:off x="3663401" y="138956"/>
+            <a:ext cx="294289" cy="6492961"/>
+          </a:xfrm>
+          <a:prstGeom prst="rect">
+            <a:avLst/>
+          </a:prstGeom>
+          <a:noFill/>
+          <a:ln w="28575" cap="flat" cmpd="sng" algn="ctr">
+            <a:solidFill>
+              <a:schemeClr val="accent2"/>
+            </a:solidFill>
+            <a:prstDash val="solid"/>
+            <a:round/>
+            <a:headEnd type="none" w="med" len="med"/>
+            <a:tailEnd type="none" w="med" len="med"/>
+          </a:ln>
+        </p:spPr>
+        <p:style>
+          <a:lnRef idx="0">
+            <a:scrgbClr r="0" g="0" b="0"/>
+          </a:lnRef>
+          <a:fillRef idx="0">
+            <a:scrgbClr r="0" g="0" b="0"/>
+          </a:fillRef>
+          <a:effectRef idx="0">
+            <a:scrgbClr r="0" g="0" b="0"/>
+          </a:effectRef>
+          <a:fontRef idx="minor">
+            <a:schemeClr val="accent2"/>
+          </a:fontRef>
+        </p:style>
+        <p:txBody>
+          <a:bodyPr rtlCol="0" anchor="ctr"/>
+          <a:lstStyle/>
+          <a:p>
+            <a:pPr algn="ctr"/>
+            <a:endParaRPr lang="en-US"/>
+          </a:p>
+        </p:txBody>
+      </p:sp>
+    </p:spTree>
+    <p:extLst>
+      <p:ext uri="{BB962C8B-B14F-4D97-AF65-F5344CB8AC3E}">
+        <p14:creationId xmlns:p14="http://schemas.microsoft.com/office/powerpoint/2010/main" val="3181159687"/>
+      </p:ext>
+    </p:extLst>
+  </p:cSld>
+  <p:clrMapOvr>
+    <a:masterClrMapping/>
+  </p:clrMapOvr>
+</p:sld>
+</file>
+
+<file path=ppt/slides/slide8.xml><?xml version="1.0" encoding="utf-8"?>
+<p:sld xmlns:a="http://schemas.openxmlformats.org/drawingml/2006/main" xmlns:r="http://schemas.openxmlformats.org/officeDocument/2006/relationships" xmlns:p="http://schemas.openxmlformats.org/presentationml/2006/main">
+  <p:cSld>
+    <p:spTree>
+      <p:nvGrpSpPr>
+        <p:cNvPr id="1" name=""/>
+        <p:cNvGrpSpPr/>
+        <p:nvPr/>
+      </p:nvGrpSpPr>
+      <p:grpSpPr>
+        <a:xfrm>
+          <a:off x="0" y="0"/>
+          <a:ext cx="0" cy="0"/>
+          <a:chOff x="0" y="0"/>
+          <a:chExt cx="0" cy="0"/>
+        </a:xfrm>
+      </p:grpSpPr>
+      <p:sp>
+        <p:nvSpPr>
+          <p:cNvPr id="2" name="Title 1">
+            <a:extLst>
+              <a:ext uri="{FF2B5EF4-FFF2-40B4-BE49-F238E27FC236}">
+                <a16:creationId xmlns:a16="http://schemas.microsoft.com/office/drawing/2014/main" id="{208C63A9-020C-F365-AFD3-01E82296B430}"/>
+              </a:ext>
+            </a:extLst>
+          </p:cNvPr>
+          <p:cNvSpPr>
+            <a:spLocks noGrp="1"/>
+          </p:cNvSpPr>
+          <p:nvPr>
+            <p:ph type="title"/>
+          </p:nvPr>
+        </p:nvSpPr>
+        <p:spPr/>
+        <p:txBody>
+          <a:bodyPr/>
+          <a:lstStyle/>
+          <a:p>
+            <a:r>
+              <a:rPr lang="en-US" dirty="0"/>
+              <a:t>Non-seasonal</a:t>
+            </a:r>
+          </a:p>
+        </p:txBody>
+      </p:sp>
+      <p:pic>
+        <p:nvPicPr>
+          <p:cNvPr id="5" name="Content Placeholder 4" descr="A screenshot of a graph&#10;&#10;Description automatically generated">
+            <a:extLst>
+              <a:ext uri="{FF2B5EF4-FFF2-40B4-BE49-F238E27FC236}">
+                <a16:creationId xmlns:a16="http://schemas.microsoft.com/office/drawing/2014/main" id="{69597DCF-B82F-C85D-F41C-B166175D5F11}"/>
+              </a:ext>
+            </a:extLst>
+          </p:cNvPr>
+          <p:cNvPicPr>
+            <a:picLocks noGrp="1" noChangeAspect="1"/>
+          </p:cNvPicPr>
+          <p:nvPr>
+            <p:ph idx="1"/>
+          </p:nvPr>
+        </p:nvPicPr>
+        <p:blipFill>
+          <a:blip r:embed="rId2"/>
+          <a:stretch>
+            <a:fillRect/>
+          </a:stretch>
+        </p:blipFill>
+        <p:spPr>
+          <a:xfrm>
+            <a:off x="838200" y="1846646"/>
+            <a:ext cx="5443016" cy="4351338"/>
+          </a:xfrm>
+        </p:spPr>
+      </p:pic>
+      <p:pic>
+        <p:nvPicPr>
+          <p:cNvPr id="7" name="Picture 6" descr="A graph of different colored lines&#10;&#10;Description automatically generated with medium confidence">
+            <a:extLst>
+              <a:ext uri="{FF2B5EF4-FFF2-40B4-BE49-F238E27FC236}">
+                <a16:creationId xmlns:a16="http://schemas.microsoft.com/office/drawing/2014/main" id="{413D75D3-243E-BEB8-9F41-6D1A62560B37}"/>
+              </a:ext>
+            </a:extLst>
+          </p:cNvPr>
+          <p:cNvPicPr>
+            <a:picLocks noChangeAspect="1"/>
+          </p:cNvPicPr>
+          <p:nvPr/>
+        </p:nvPicPr>
+        <p:blipFill>
+          <a:blip r:embed="rId3"/>
+          <a:stretch>
+            <a:fillRect/>
+          </a:stretch>
+        </p:blipFill>
+        <p:spPr>
+          <a:xfrm>
+            <a:off x="6481598" y="2438400"/>
+            <a:ext cx="5205904" cy="2602952"/>
           </a:xfrm>
           <a:prstGeom prst="rect">
             <a:avLst/>
@@ -3971,7 +4681,7 @@
     </p:spTree>
     <p:extLst>
       <p:ext uri="{BB962C8B-B14F-4D97-AF65-F5344CB8AC3E}">
-        <p14:creationId xmlns:p14="http://schemas.microsoft.com/office/powerpoint/2010/main" val="508195788"/>
+        <p14:creationId xmlns:p14="http://schemas.microsoft.com/office/powerpoint/2010/main" val="4237844573"/>
       </p:ext>
     </p:extLst>
   </p:cSld>

</xml_diff>